<commit_message>
chg: Several targets from target list moved to OPAC.miz
</commit_message>
<xml_diff>
--- a/INTEL/VID/WIP/INTREP VID OPAC-003 - DUSS ground combat tactics.pptx
+++ b/INTEL/VID/WIP/INTREP VID OPAC-003 - DUSS ground combat tactics.pptx
@@ -123,7 +123,7 @@
   </p:defaultTextStyle>
   <p:extLst>
     <p:ext uri="{EFAFB233-063F-42B5-8137-9DF3F51BA10A}">
-      <p15:sldGuideLst xmlns:p15="http://schemas.microsoft.com/office/powerpoint/2012/main" xmlns="">
+      <p15:sldGuideLst xmlns="" xmlns:p15="http://schemas.microsoft.com/office/powerpoint/2012/main">
         <p15:guide id="1" orient="horz" pos="1620">
           <p15:clr>
             <a:srgbClr val="A4A3A4"/>
@@ -223,7 +223,7 @@
             <a:fld id="{40637A30-8EE1-4060-9976-8832FC89EE34}" type="datetimeFigureOut">
               <a:rPr lang="nb-NO" smtClean="0"/>
               <a:pPr/>
-              <a:t>16.11.2024</a:t>
+              <a:t>28.12.2024</a:t>
             </a:fld>
             <a:endParaRPr lang="nb-NO"/>
           </a:p>
@@ -393,7 +393,7 @@
     </p:spTree>
     <p:extLst>
       <p:ext uri="{BB962C8B-B14F-4D97-AF65-F5344CB8AC3E}">
-        <p14:creationId xmlns:p14="http://schemas.microsoft.com/office/powerpoint/2010/main" xmlns="" val="2256331300"/>
+        <p14:creationId xmlns="" xmlns:p14="http://schemas.microsoft.com/office/powerpoint/2010/main" val="2256331300"/>
       </p:ext>
     </p:extLst>
   </p:cSld>
@@ -3902,7 +3902,7 @@
         <p:spPr>
           <a:xfrm>
             <a:off x="0" y="2931790"/>
-            <a:ext cx="9144000" cy="1200329"/>
+            <a:ext cx="9144000" cy="1015663"/>
           </a:xfrm>
           <a:prstGeom prst="rect">
             <a:avLst/>
@@ -3917,16 +3917,23 @@
           <a:p>
             <a:pPr algn="ctr"/>
             <a:r>
-              <a:rPr lang="nb-NO" sz="2800" b="1" dirty="0">
+              <a:rPr lang="nb-NO" sz="2400" b="1" dirty="0" smtClean="0">
                 <a:latin typeface="Arial Black" pitchFamily="34" charset="0"/>
                 <a:ea typeface="MS Mincho" pitchFamily="49" charset="-128"/>
               </a:rPr>
-              <a:t>SYRIAN GROUND COMBAT TACTICS</a:t>
+              <a:t>NOTIAN and KAMBILAND </a:t>
+            </a:r>
+            <a:r>
+              <a:rPr lang="nb-NO" sz="2400" b="1" dirty="0">
+                <a:latin typeface="Arial Black" pitchFamily="34" charset="0"/>
+                <a:ea typeface="MS Mincho" pitchFamily="49" charset="-128"/>
+              </a:rPr>
+              <a:t>GROUND COMBAT TACTICS</a:t>
             </a:r>
           </a:p>
           <a:p>
             <a:pPr algn="ctr"/>
-            <a:endParaRPr lang="nb-NO" sz="1400" b="1" dirty="0">
+            <a:endParaRPr lang="nb-NO" sz="1200" b="1" dirty="0">
               <a:latin typeface="Arial Black" pitchFamily="34" charset="0"/>
               <a:ea typeface="MS Mincho" pitchFamily="49" charset="-128"/>
             </a:endParaRPr>
@@ -3934,20 +3941,20 @@
           <a:p>
             <a:pPr algn="ctr"/>
             <a:r>
-              <a:rPr lang="nb-NO" sz="2800" b="1" dirty="0">
+              <a:rPr lang="nb-NO" sz="2400" b="1" dirty="0">
                 <a:latin typeface="Arial Black" pitchFamily="34" charset="0"/>
                 <a:ea typeface="MS Mincho" pitchFamily="49" charset="-128"/>
               </a:rPr>
               <a:t>INTREP </a:t>
             </a:r>
             <a:r>
-              <a:rPr lang="nb-NO" sz="2800" b="1" dirty="0" smtClean="0">
+              <a:rPr lang="nb-NO" sz="2400" b="1" dirty="0" smtClean="0">
                 <a:latin typeface="Arial Black" pitchFamily="34" charset="0"/>
                 <a:ea typeface="MS Mincho" pitchFamily="49" charset="-128"/>
               </a:rPr>
-              <a:t>VID-OPAT-003</a:t>
-            </a:r>
-            <a:endParaRPr lang="nb-NO" sz="2800" b="1" dirty="0">
+              <a:t>VID-OPAC-003</a:t>
+            </a:r>
+            <a:endParaRPr lang="nb-NO" sz="2400" b="1" dirty="0">
               <a:latin typeface="MS Mincho" pitchFamily="49" charset="-128"/>
               <a:ea typeface="MS Mincho" pitchFamily="49" charset="-128"/>
             </a:endParaRPr>
@@ -4032,7 +4039,7 @@
                 <a:latin typeface="Arial" pitchFamily="34" charset="0"/>
                 <a:cs typeface="Arial" pitchFamily="34" charset="0"/>
               </a:rPr>
-              <a:t>2024-11-16</a:t>
+              <a:t>2024-12-28</a:t>
             </a:r>
             <a:endParaRPr lang="en-US" sz="1400" dirty="0">
               <a:latin typeface="Arial" pitchFamily="34" charset="0"/>
@@ -4900,7 +4907,7 @@
           <p:nvPr>
             <p:extLst>
               <p:ext uri="{D42A27DB-BD31-4B8C-83A1-F6EECF244321}">
-                <p14:modId xmlns:p14="http://schemas.microsoft.com/office/powerpoint/2010/main" xmlns="" val="253851099"/>
+                <p14:modId xmlns="" xmlns:p14="http://schemas.microsoft.com/office/powerpoint/2010/main" val="253851099"/>
               </p:ext>
             </p:extLst>
           </p:nvPr>
@@ -4919,14 +4926,14 @@
                 <a:gridCol w="4877626">
                   <a:extLst>
                     <a:ext uri="{9D8B030D-6E8A-4147-A177-3AD203B41FA5}">
-                      <a16:colId xmlns:a16="http://schemas.microsoft.com/office/drawing/2014/main" xmlns="" val="20000"/>
+                      <a16:colId xmlns="" xmlns:a16="http://schemas.microsoft.com/office/drawing/2014/main" val="20000"/>
                     </a:ext>
                   </a:extLst>
                 </a:gridCol>
                 <a:gridCol w="3310192">
                   <a:extLst>
                     <a:ext uri="{9D8B030D-6E8A-4147-A177-3AD203B41FA5}">
-                      <a16:colId xmlns:a16="http://schemas.microsoft.com/office/drawing/2014/main" xmlns="" val="20001"/>
+                      <a16:colId xmlns="" xmlns:a16="http://schemas.microsoft.com/office/drawing/2014/main" val="20001"/>
                     </a:ext>
                   </a:extLst>
                 </a:gridCol>
@@ -4968,7 +4975,7 @@
                 </a:tc>
                 <a:extLst>
                   <a:ext uri="{0D108BD9-81ED-4DB2-BD59-A6C34878D82A}">
-                    <a16:rowId xmlns:a16="http://schemas.microsoft.com/office/drawing/2014/main" xmlns="" val="10000"/>
+                    <a16:rowId xmlns="" xmlns:a16="http://schemas.microsoft.com/office/drawing/2014/main" val="10000"/>
                   </a:ext>
                 </a:extLst>
               </a:tr>
@@ -5054,7 +5061,7 @@
                 </a:tc>
                 <a:extLst>
                   <a:ext uri="{0D108BD9-81ED-4DB2-BD59-A6C34878D82A}">
-                    <a16:rowId xmlns:a16="http://schemas.microsoft.com/office/drawing/2014/main" xmlns="" val="10001"/>
+                    <a16:rowId xmlns="" xmlns:a16="http://schemas.microsoft.com/office/drawing/2014/main" val="10001"/>
                   </a:ext>
                 </a:extLst>
               </a:tr>
@@ -5131,7 +5138,7 @@
                 </a:tc>
                 <a:extLst>
                   <a:ext uri="{0D108BD9-81ED-4DB2-BD59-A6C34878D82A}">
-                    <a16:rowId xmlns:a16="http://schemas.microsoft.com/office/drawing/2014/main" xmlns="" val="10002"/>
+                    <a16:rowId xmlns="" xmlns:a16="http://schemas.microsoft.com/office/drawing/2014/main" val="10002"/>
                   </a:ext>
                 </a:extLst>
               </a:tr>
@@ -5190,7 +5197,7 @@
                 </a:tc>
                 <a:extLst>
                   <a:ext uri="{0D108BD9-81ED-4DB2-BD59-A6C34878D82A}">
-                    <a16:rowId xmlns:a16="http://schemas.microsoft.com/office/drawing/2014/main" xmlns="" val="10003"/>
+                    <a16:rowId xmlns="" xmlns:a16="http://schemas.microsoft.com/office/drawing/2014/main" val="10003"/>
                   </a:ext>
                 </a:extLst>
               </a:tr>
@@ -5244,7 +5251,7 @@
                 </a:tc>
                 <a:extLst>
                   <a:ext uri="{0D108BD9-81ED-4DB2-BD59-A6C34878D82A}">
-                    <a16:rowId xmlns:a16="http://schemas.microsoft.com/office/drawing/2014/main" xmlns="" val="10004"/>
+                    <a16:rowId xmlns="" xmlns:a16="http://schemas.microsoft.com/office/drawing/2014/main" val="10004"/>
                   </a:ext>
                 </a:extLst>
               </a:tr>
@@ -5298,7 +5305,7 @@
                 </a:tc>
                 <a:extLst>
                   <a:ext uri="{0D108BD9-81ED-4DB2-BD59-A6C34878D82A}">
-                    <a16:rowId xmlns:a16="http://schemas.microsoft.com/office/drawing/2014/main" xmlns="" val="10005"/>
+                    <a16:rowId xmlns="" xmlns:a16="http://schemas.microsoft.com/office/drawing/2014/main" val="10005"/>
                   </a:ext>
                 </a:extLst>
               </a:tr>
@@ -5352,7 +5359,7 @@
                 </a:tc>
                 <a:extLst>
                   <a:ext uri="{0D108BD9-81ED-4DB2-BD59-A6C34878D82A}">
-                    <a16:rowId xmlns:a16="http://schemas.microsoft.com/office/drawing/2014/main" xmlns="" val="10006"/>
+                    <a16:rowId xmlns="" xmlns:a16="http://schemas.microsoft.com/office/drawing/2014/main" val="10006"/>
                   </a:ext>
                 </a:extLst>
               </a:tr>
@@ -5398,7 +5405,7 @@
                 </a:tc>
                 <a:extLst>
                   <a:ext uri="{0D108BD9-81ED-4DB2-BD59-A6C34878D82A}">
-                    <a16:rowId xmlns:a16="http://schemas.microsoft.com/office/drawing/2014/main" xmlns="" val="10007"/>
+                    <a16:rowId xmlns="" xmlns:a16="http://schemas.microsoft.com/office/drawing/2014/main" val="10007"/>
                   </a:ext>
                 </a:extLst>
               </a:tr>
@@ -5462,7 +5469,7 @@
                 </a:tc>
                 <a:extLst>
                   <a:ext uri="{0D108BD9-81ED-4DB2-BD59-A6C34878D82A}">
-                    <a16:rowId xmlns:a16="http://schemas.microsoft.com/office/drawing/2014/main" xmlns="" val="10008"/>
+                    <a16:rowId xmlns="" xmlns:a16="http://schemas.microsoft.com/office/drawing/2014/main" val="10008"/>
                   </a:ext>
                 </a:extLst>
               </a:tr>
@@ -5531,7 +5538,7 @@
                 </a:tc>
                 <a:extLst>
                   <a:ext uri="{0D108BD9-81ED-4DB2-BD59-A6C34878D82A}">
-                    <a16:rowId xmlns:a16="http://schemas.microsoft.com/office/drawing/2014/main" xmlns="" val="10009"/>
+                    <a16:rowId xmlns="" xmlns:a16="http://schemas.microsoft.com/office/drawing/2014/main" val="10009"/>
                   </a:ext>
                 </a:extLst>
               </a:tr>
@@ -6328,7 +6335,7 @@
           <p:cNvPr id="2" name="Tittel 1">
             <a:extLst>
               <a:ext uri="{FF2B5EF4-FFF2-40B4-BE49-F238E27FC236}">
-                <a16:creationId xmlns:a16="http://schemas.microsoft.com/office/drawing/2014/main" xmlns="" id="{82C3DB40-AD8A-4EAE-B71F-603F0BE2490F}"/>
+                <a16:creationId xmlns="" xmlns:a16="http://schemas.microsoft.com/office/drawing/2014/main" id="{82C3DB40-AD8A-4EAE-B71F-603F0BE2490F}"/>
               </a:ext>
             </a:extLst>
           </p:cNvPr>
@@ -6356,7 +6363,7 @@
           <p:cNvPr id="3" name="TekstSylinder 2">
             <a:extLst>
               <a:ext uri="{FF2B5EF4-FFF2-40B4-BE49-F238E27FC236}">
-                <a16:creationId xmlns:a16="http://schemas.microsoft.com/office/drawing/2014/main" xmlns="" id="{C1F2D31E-D705-42D8-AAA2-091978AFAB91}"/>
+                <a16:creationId xmlns="" xmlns:a16="http://schemas.microsoft.com/office/drawing/2014/main" id="{C1F2D31E-D705-42D8-AAA2-091978AFAB91}"/>
               </a:ext>
             </a:extLst>
           </p:cNvPr>
@@ -6413,7 +6420,7 @@
     </p:spTree>
     <p:extLst>
       <p:ext uri="{BB962C8B-B14F-4D97-AF65-F5344CB8AC3E}">
-        <p14:creationId xmlns:p14="http://schemas.microsoft.com/office/powerpoint/2010/main" xmlns="" val="2548648399"/>
+        <p14:creationId xmlns="" xmlns:p14="http://schemas.microsoft.com/office/powerpoint/2010/main" val="2548648399"/>
       </p:ext>
     </p:extLst>
   </p:cSld>
@@ -6445,7 +6452,7 @@
           <p:cNvPr id="2" name="Tittel 1">
             <a:extLst>
               <a:ext uri="{FF2B5EF4-FFF2-40B4-BE49-F238E27FC236}">
-                <a16:creationId xmlns:a16="http://schemas.microsoft.com/office/drawing/2014/main" xmlns="" id="{82C3DB40-AD8A-4EAE-B71F-603F0BE2490F}"/>
+                <a16:creationId xmlns="" xmlns:a16="http://schemas.microsoft.com/office/drawing/2014/main" id="{82C3DB40-AD8A-4EAE-B71F-603F0BE2490F}"/>
               </a:ext>
             </a:extLst>
           </p:cNvPr>
@@ -6473,7 +6480,7 @@
           <p:cNvPr id="3" name="TekstSylinder 2">
             <a:extLst>
               <a:ext uri="{FF2B5EF4-FFF2-40B4-BE49-F238E27FC236}">
-                <a16:creationId xmlns:a16="http://schemas.microsoft.com/office/drawing/2014/main" xmlns="" id="{C1F2D31E-D705-42D8-AAA2-091978AFAB91}"/>
+                <a16:creationId xmlns="" xmlns:a16="http://schemas.microsoft.com/office/drawing/2014/main" id="{C1F2D31E-D705-42D8-AAA2-091978AFAB91}"/>
               </a:ext>
             </a:extLst>
           </p:cNvPr>
@@ -6527,7 +6534,7 @@
     </p:spTree>
     <p:extLst>
       <p:ext uri="{BB962C8B-B14F-4D97-AF65-F5344CB8AC3E}">
-        <p14:creationId xmlns:p14="http://schemas.microsoft.com/office/powerpoint/2010/main" xmlns="" val="431210920"/>
+        <p14:creationId xmlns="" xmlns:p14="http://schemas.microsoft.com/office/powerpoint/2010/main" val="431210920"/>
       </p:ext>
     </p:extLst>
   </p:cSld>
@@ -6559,7 +6566,7 @@
           <p:cNvPr id="2" name="Tittel 1">
             <a:extLst>
               <a:ext uri="{FF2B5EF4-FFF2-40B4-BE49-F238E27FC236}">
-                <a16:creationId xmlns:a16="http://schemas.microsoft.com/office/drawing/2014/main" xmlns="" id="{82C3DB40-AD8A-4EAE-B71F-603F0BE2490F}"/>
+                <a16:creationId xmlns="" xmlns:a16="http://schemas.microsoft.com/office/drawing/2014/main" id="{82C3DB40-AD8A-4EAE-B71F-603F0BE2490F}"/>
               </a:ext>
             </a:extLst>
           </p:cNvPr>
@@ -6587,7 +6594,7 @@
           <p:cNvPr id="3" name="TekstSylinder 2">
             <a:extLst>
               <a:ext uri="{FF2B5EF4-FFF2-40B4-BE49-F238E27FC236}">
-                <a16:creationId xmlns:a16="http://schemas.microsoft.com/office/drawing/2014/main" xmlns="" id="{C1F2D31E-D705-42D8-AAA2-091978AFAB91}"/>
+                <a16:creationId xmlns="" xmlns:a16="http://schemas.microsoft.com/office/drawing/2014/main" id="{C1F2D31E-D705-42D8-AAA2-091978AFAB91}"/>
               </a:ext>
             </a:extLst>
           </p:cNvPr>
@@ -6641,7 +6648,7 @@
     </p:spTree>
     <p:extLst>
       <p:ext uri="{BB962C8B-B14F-4D97-AF65-F5344CB8AC3E}">
-        <p14:creationId xmlns:p14="http://schemas.microsoft.com/office/powerpoint/2010/main" xmlns="" val="2686895182"/>
+        <p14:creationId xmlns="" xmlns:p14="http://schemas.microsoft.com/office/powerpoint/2010/main" val="2686895182"/>
       </p:ext>
     </p:extLst>
   </p:cSld>
@@ -6673,7 +6680,7 @@
           <p:cNvPr id="2" name="Tittel 1">
             <a:extLst>
               <a:ext uri="{FF2B5EF4-FFF2-40B4-BE49-F238E27FC236}">
-                <a16:creationId xmlns:a16="http://schemas.microsoft.com/office/drawing/2014/main" xmlns="" id="{4A48007C-00A6-4108-8C57-9DA36E26FE29}"/>
+                <a16:creationId xmlns="" xmlns:a16="http://schemas.microsoft.com/office/drawing/2014/main" id="{4A48007C-00A6-4108-8C57-9DA36E26FE29}"/>
               </a:ext>
             </a:extLst>
           </p:cNvPr>
@@ -6701,7 +6708,7 @@
           <p:cNvPr id="3" name="TekstSylinder 2">
             <a:extLst>
               <a:ext uri="{FF2B5EF4-FFF2-40B4-BE49-F238E27FC236}">
-                <a16:creationId xmlns:a16="http://schemas.microsoft.com/office/drawing/2014/main" xmlns="" id="{A3A71D47-87EC-494D-9F7D-2A46746C317E}"/>
+                <a16:creationId xmlns="" xmlns:a16="http://schemas.microsoft.com/office/drawing/2014/main" id="{A3A71D47-87EC-494D-9F7D-2A46746C317E}"/>
               </a:ext>
             </a:extLst>
           </p:cNvPr>
@@ -6779,7 +6786,7 @@
     </p:spTree>
     <p:extLst>
       <p:ext uri="{BB962C8B-B14F-4D97-AF65-F5344CB8AC3E}">
-        <p14:creationId xmlns:p14="http://schemas.microsoft.com/office/powerpoint/2010/main" xmlns="" val="251277543"/>
+        <p14:creationId xmlns="" xmlns:p14="http://schemas.microsoft.com/office/powerpoint/2010/main" val="251277543"/>
       </p:ext>
     </p:extLst>
   </p:cSld>
@@ -7483,8 +7490,68 @@
                 <a:latin typeface="Arial" pitchFamily="34" charset="0"/>
                 <a:cs typeface="Arial" pitchFamily="34" charset="0"/>
               </a:rPr>
-              <a:t>This document describes how Syrian ground forces operate</a:t>
-            </a:r>
+              <a:t>This document describes </a:t>
+            </a:r>
+            <a:r>
+              <a:rPr lang="nb-NO" sz="1400" dirty="0" err="1">
+                <a:latin typeface="Arial" pitchFamily="34" charset="0"/>
+                <a:cs typeface="Arial" pitchFamily="34" charset="0"/>
+              </a:rPr>
+              <a:t>how</a:t>
+            </a:r>
+            <a:r>
+              <a:rPr lang="nb-NO" sz="1400" dirty="0">
+                <a:latin typeface="Arial" pitchFamily="34" charset="0"/>
+                <a:cs typeface="Arial" pitchFamily="34" charset="0"/>
+              </a:rPr>
+              <a:t> </a:t>
+            </a:r>
+            <a:r>
+              <a:rPr lang="nb-NO" sz="1400" dirty="0" smtClean="0">
+                <a:latin typeface="Arial" pitchFamily="34" charset="0"/>
+                <a:cs typeface="Arial" pitchFamily="34" charset="0"/>
+              </a:rPr>
+              <a:t>Notian and Kambiland </a:t>
+            </a:r>
+            <a:r>
+              <a:rPr lang="nb-NO" sz="1400" dirty="0">
+                <a:latin typeface="Arial" pitchFamily="34" charset="0"/>
+                <a:cs typeface="Arial" pitchFamily="34" charset="0"/>
+              </a:rPr>
+              <a:t>ground </a:t>
+            </a:r>
+            <a:r>
+              <a:rPr lang="nb-NO" sz="1400" dirty="0" err="1">
+                <a:latin typeface="Arial" pitchFamily="34" charset="0"/>
+                <a:cs typeface="Arial" pitchFamily="34" charset="0"/>
+              </a:rPr>
+              <a:t>forces</a:t>
+            </a:r>
+            <a:r>
+              <a:rPr lang="nb-NO" sz="1400" dirty="0">
+                <a:latin typeface="Arial" pitchFamily="34" charset="0"/>
+                <a:cs typeface="Arial" pitchFamily="34" charset="0"/>
+              </a:rPr>
+              <a:t> </a:t>
+            </a:r>
+            <a:r>
+              <a:rPr lang="nb-NO" sz="1400" dirty="0" err="1" smtClean="0">
+                <a:latin typeface="Arial" pitchFamily="34" charset="0"/>
+                <a:cs typeface="Arial" pitchFamily="34" charset="0"/>
+              </a:rPr>
+              <a:t>operate</a:t>
+            </a:r>
+            <a:r>
+              <a:rPr lang="nb-NO" sz="1400" dirty="0" smtClean="0">
+                <a:latin typeface="Arial" pitchFamily="34" charset="0"/>
+                <a:cs typeface="Arial" pitchFamily="34" charset="0"/>
+              </a:rPr>
+              <a:t>.</a:t>
+            </a:r>
+            <a:endParaRPr lang="nb-NO" sz="1400" dirty="0">
+              <a:latin typeface="Arial" pitchFamily="34" charset="0"/>
+              <a:cs typeface="Arial" pitchFamily="34" charset="0"/>
+            </a:endParaRPr>
           </a:p>
           <a:p>
             <a:endParaRPr lang="nb-NO" sz="1400" dirty="0">
@@ -8996,7 +9063,42 @@
                 <a:latin typeface="Arial" pitchFamily="34" charset="0"/>
                 <a:cs typeface="Arial" pitchFamily="34" charset="0"/>
               </a:rPr>
-              <a:t>The basic fighting formation in the Syrian army is the division. Here is a representation of a division during an offansive.</a:t>
+              <a:t>The basic fighting formation in </a:t>
+            </a:r>
+            <a:r>
+              <a:rPr lang="nb-NO" sz="1100" dirty="0" err="1">
+                <a:latin typeface="Arial" pitchFamily="34" charset="0"/>
+                <a:cs typeface="Arial" pitchFamily="34" charset="0"/>
+              </a:rPr>
+              <a:t>the</a:t>
+            </a:r>
+            <a:r>
+              <a:rPr lang="nb-NO" sz="1100" dirty="0">
+                <a:latin typeface="Arial" pitchFamily="34" charset="0"/>
+                <a:cs typeface="Arial" pitchFamily="34" charset="0"/>
+              </a:rPr>
+              <a:t> </a:t>
+            </a:r>
+            <a:r>
+              <a:rPr lang="nb-NO" sz="1100" dirty="0" err="1" smtClean="0">
+                <a:latin typeface="Arial" pitchFamily="34" charset="0"/>
+                <a:cs typeface="Arial" pitchFamily="34" charset="0"/>
+              </a:rPr>
+              <a:t>army</a:t>
+            </a:r>
+            <a:r>
+              <a:rPr lang="nb-NO" sz="1100" dirty="0" smtClean="0">
+                <a:latin typeface="Arial" pitchFamily="34" charset="0"/>
+                <a:cs typeface="Arial" pitchFamily="34" charset="0"/>
+              </a:rPr>
+              <a:t> </a:t>
+            </a:r>
+            <a:r>
+              <a:rPr lang="nb-NO" sz="1100" dirty="0">
+                <a:latin typeface="Arial" pitchFamily="34" charset="0"/>
+                <a:cs typeface="Arial" pitchFamily="34" charset="0"/>
+              </a:rPr>
+              <a:t>is the division. Here is a representation of a division during an offansive.</a:t>
             </a:r>
           </a:p>
           <a:p>
@@ -9208,7 +9310,7 @@
     </p:spTree>
     <p:extLst>
       <p:ext uri="{BB962C8B-B14F-4D97-AF65-F5344CB8AC3E}">
-        <p14:creationId xmlns:p14="http://schemas.microsoft.com/office/powerpoint/2010/main" xmlns="" val="1177541819"/>
+        <p14:creationId xmlns="" xmlns:p14="http://schemas.microsoft.com/office/powerpoint/2010/main" val="1177541819"/>
       </p:ext>
     </p:extLst>
   </p:cSld>
@@ -10752,7 +10854,7 @@
     </p:spTree>
     <p:extLst>
       <p:ext uri="{BB962C8B-B14F-4D97-AF65-F5344CB8AC3E}">
-        <p14:creationId xmlns:p14="http://schemas.microsoft.com/office/powerpoint/2010/main" xmlns="" val="390204938"/>
+        <p14:creationId xmlns="" xmlns:p14="http://schemas.microsoft.com/office/powerpoint/2010/main" val="390204938"/>
       </p:ext>
     </p:extLst>
   </p:cSld>
@@ -11545,7 +11647,7 @@
     </p:spTree>
     <p:extLst>
       <p:ext uri="{BB962C8B-B14F-4D97-AF65-F5344CB8AC3E}">
-        <p14:creationId xmlns:p14="http://schemas.microsoft.com/office/powerpoint/2010/main" xmlns="" val="4063869597"/>
+        <p14:creationId xmlns="" xmlns:p14="http://schemas.microsoft.com/office/powerpoint/2010/main" val="4063869597"/>
       </p:ext>
     </p:extLst>
   </p:cSld>
@@ -12325,7 +12427,7 @@
     </p:spTree>
     <p:extLst>
       <p:ext uri="{BB962C8B-B14F-4D97-AF65-F5344CB8AC3E}">
-        <p14:creationId xmlns:p14="http://schemas.microsoft.com/office/powerpoint/2010/main" xmlns="" val="3349576044"/>
+        <p14:creationId xmlns="" xmlns:p14="http://schemas.microsoft.com/office/powerpoint/2010/main" val="3349576044"/>
       </p:ext>
     </p:extLst>
   </p:cSld>

</xml_diff>